<commit_message>
start working on getting started page
</commit_message>
<xml_diff>
--- a/images/graphics.pptx
+++ b/images/graphics.pptx
@@ -6,6 +6,7 @@
   </p:sldMasterIdLst>
   <p:sldIdLst>
     <p:sldId id="256" r:id="rId2"/>
+    <p:sldId id="257" r:id="rId3"/>
   </p:sldIdLst>
   <p:sldSz cx="9144000" cy="6858000" type="screen4x3"/>
   <p:notesSz cx="6858000" cy="9144000"/>
@@ -3952,6 +3953,206 @@
     <p:extLst>
       <p:ext uri="{BB962C8B-B14F-4D97-AF65-F5344CB8AC3E}">
         <p14:creationId xmlns:p14="http://schemas.microsoft.com/office/powerpoint/2010/main" val="2205985339"/>
+      </p:ext>
+    </p:extLst>
+  </p:cSld>
+  <p:clrMapOvr>
+    <a:masterClrMapping/>
+  </p:clrMapOvr>
+</p:sld>
+</file>
+
+<file path=ppt/slides/slide2.xml><?xml version="1.0" encoding="utf-8"?>
+<p:sld xmlns:a="http://schemas.openxmlformats.org/drawingml/2006/main" xmlns:r="http://schemas.openxmlformats.org/officeDocument/2006/relationships" xmlns:p="http://schemas.openxmlformats.org/presentationml/2006/main">
+  <p:cSld>
+    <p:spTree>
+      <p:nvGrpSpPr>
+        <p:cNvPr id="1" name=""/>
+        <p:cNvGrpSpPr/>
+        <p:nvPr/>
+      </p:nvGrpSpPr>
+      <p:grpSpPr>
+        <a:xfrm>
+          <a:off x="0" y="0"/>
+          <a:ext cx="0" cy="0"/>
+          <a:chOff x="0" y="0"/>
+          <a:chExt cx="0" cy="0"/>
+        </a:xfrm>
+      </p:grpSpPr>
+      <p:sp>
+        <p:nvSpPr>
+          <p:cNvPr id="2" name="Cube 1"/>
+          <p:cNvSpPr/>
+          <p:nvPr/>
+        </p:nvSpPr>
+        <p:spPr>
+          <a:xfrm>
+            <a:off x="2921077" y="2357414"/>
+            <a:ext cx="633297" cy="563991"/>
+          </a:xfrm>
+          <a:prstGeom prst="cube">
+            <a:avLst>
+              <a:gd name="adj" fmla="val 30555"/>
+            </a:avLst>
+          </a:prstGeom>
+          <a:ln>
+            <a:noFill/>
+          </a:ln>
+          <a:effectLst/>
+        </p:spPr>
+        <p:style>
+          <a:lnRef idx="1">
+            <a:schemeClr val="accent1"/>
+          </a:lnRef>
+          <a:fillRef idx="3">
+            <a:schemeClr val="accent1"/>
+          </a:fillRef>
+          <a:effectRef idx="2">
+            <a:schemeClr val="accent1"/>
+          </a:effectRef>
+          <a:fontRef idx="minor">
+            <a:schemeClr val="lt1"/>
+          </a:fontRef>
+        </p:style>
+        <p:txBody>
+          <a:bodyPr rtlCol="0" anchor="ctr"/>
+          <a:lstStyle/>
+          <a:p>
+            <a:pPr algn="ctr"/>
+            <a:endParaRPr lang="fr-FR"/>
+          </a:p>
+        </p:txBody>
+      </p:sp>
+      <p:sp>
+        <p:nvSpPr>
+          <p:cNvPr id="3" name="Frame 2"/>
+          <p:cNvSpPr/>
+          <p:nvPr/>
+        </p:nvSpPr>
+        <p:spPr>
+          <a:xfrm>
+            <a:off x="2720821" y="2134283"/>
+            <a:ext cx="1034802" cy="992206"/>
+          </a:xfrm>
+          <a:prstGeom prst="frame">
+            <a:avLst/>
+          </a:prstGeom>
+          <a:ln>
+            <a:noFill/>
+          </a:ln>
+          <a:effectLst/>
+        </p:spPr>
+        <p:style>
+          <a:lnRef idx="1">
+            <a:schemeClr val="accent1"/>
+          </a:lnRef>
+          <a:fillRef idx="3">
+            <a:schemeClr val="accent1"/>
+          </a:fillRef>
+          <a:effectRef idx="2">
+            <a:schemeClr val="accent1"/>
+          </a:effectRef>
+          <a:fontRef idx="minor">
+            <a:schemeClr val="lt1"/>
+          </a:fontRef>
+        </p:style>
+        <p:txBody>
+          <a:bodyPr rtlCol="0" anchor="ctr"/>
+          <a:lstStyle/>
+          <a:p>
+            <a:pPr algn="ctr"/>
+            <a:endParaRPr lang="fr-FR">
+              <a:solidFill>
+                <a:schemeClr val="tx1"/>
+              </a:solidFill>
+            </a:endParaRPr>
+          </a:p>
+        </p:txBody>
+      </p:sp>
+      <p:sp>
+        <p:nvSpPr>
+          <p:cNvPr id="4" name="TextBox 3"/>
+          <p:cNvSpPr txBox="1"/>
+          <p:nvPr/>
+        </p:nvSpPr>
+        <p:spPr>
+          <a:xfrm>
+            <a:off x="4835896" y="2754550"/>
+            <a:ext cx="995397" cy="369332"/>
+          </a:xfrm>
+          <a:prstGeom prst="rect">
+            <a:avLst/>
+          </a:prstGeom>
+          <a:noFill/>
+        </p:spPr>
+        <p:txBody>
+          <a:bodyPr wrap="none" rtlCol="0">
+            <a:spAutoFit/>
+          </a:bodyPr>
+          <a:lstStyle/>
+          <a:p>
+            <a:r>
+              <a:rPr lang="fr-FR" dirty="0" smtClean="0">
+                <a:solidFill>
+                  <a:schemeClr val="tx2">
+                    <a:lumMod val="60000"/>
+                    <a:lumOff val="40000"/>
+                  </a:schemeClr>
+                </a:solidFill>
+              </a:rPr>
+              <a:t>Platform</a:t>
+            </a:r>
+            <a:endParaRPr lang="fr-FR" dirty="0">
+              <a:solidFill>
+                <a:schemeClr val="tx2">
+                  <a:lumMod val="60000"/>
+                  <a:lumOff val="40000"/>
+                </a:schemeClr>
+              </a:solidFill>
+            </a:endParaRPr>
+          </a:p>
+        </p:txBody>
+      </p:sp>
+      <p:sp>
+        <p:nvSpPr>
+          <p:cNvPr id="6" name="TextBox 5"/>
+          <p:cNvSpPr txBox="1"/>
+          <p:nvPr/>
+        </p:nvSpPr>
+        <p:spPr>
+          <a:xfrm>
+            <a:off x="3818601" y="2134283"/>
+            <a:ext cx="2762416" cy="830997"/>
+          </a:xfrm>
+          <a:prstGeom prst="rect">
+            <a:avLst/>
+          </a:prstGeom>
+          <a:noFill/>
+        </p:spPr>
+        <p:txBody>
+          <a:bodyPr wrap="square" rtlCol="0">
+            <a:spAutoFit/>
+          </a:bodyPr>
+          <a:lstStyle/>
+          <a:p>
+            <a:r>
+              <a:rPr lang="fr-FR" sz="4800" b="1" dirty="0" smtClean="0">
+                <a:latin typeface="Lao MN"/>
+                <a:cs typeface="Lao MN"/>
+              </a:rPr>
+              <a:t>CUBE</a:t>
+            </a:r>
+            <a:endParaRPr lang="fr-FR" sz="4800" b="1" dirty="0">
+              <a:latin typeface="Lao MN"/>
+              <a:cs typeface="Lao MN"/>
+            </a:endParaRPr>
+          </a:p>
+        </p:txBody>
+      </p:sp>
+    </p:spTree>
+    <p:extLst>
+      <p:ext uri="{BB962C8B-B14F-4D97-AF65-F5344CB8AC3E}">
+        <p14:creationId xmlns:p14="http://schemas.microsoft.com/office/powerpoint/2010/main" val="136340326"/>
       </p:ext>
     </p:extLst>
   </p:cSld>

</xml_diff>